<commit_message>
Echte QR-Codes eingefügt mit Dropbox Ordnern verknüpft
</commit_message>
<xml_diff>
--- a/004_poster_final/Globales_Poster_Final.pptx
+++ b/004_poster_final/Globales_Poster_Final.pptx
@@ -109,7 +109,7 @@
   </p:defaultTextStyle>
   <p:extLst>
     <p:ext uri="{EFAFB233-063F-42B5-8137-9DF3F51BA10A}">
-      <p15:sldGuideLst xmlns="" xmlns:p15="http://schemas.microsoft.com/office/powerpoint/2012/main">
+      <p15:sldGuideLst xmlns:p15="http://schemas.microsoft.com/office/powerpoint/2012/main" xmlns="">
         <p15:guide id="1" orient="horz" pos="22984" userDrawn="1">
           <p15:clr>
             <a:srgbClr val="A4A3A4"/>
@@ -487,22 +487,22 @@
                   <c:v>8797.7391220000009</c:v>
                 </c:pt>
                 <c:pt idx="39">
-                  <c:v>9188.4708059999939</c:v>
+                  <c:v>9188.4708059999921</c:v>
                 </c:pt>
                 <c:pt idx="40">
-                  <c:v>9500.147488000006</c:v>
+                  <c:v>9500.1474880000078</c:v>
                 </c:pt>
                 <c:pt idx="41">
                   <c:v>9836.0704679999999</c:v>
                 </c:pt>
                 <c:pt idx="42">
-                  <c:v>10016.368629999992</c:v>
+                  <c:v>10016.368629999988</c:v>
                 </c:pt>
                 <c:pt idx="43">
                   <c:v>10279.87126</c:v>
                 </c:pt>
                 <c:pt idx="44">
-                  <c:v>10665.957619999988</c:v>
+                  <c:v>10665.957619999985</c:v>
                 </c:pt>
               </c:numCache>
             </c:numRef>
@@ -696,19 +696,19 @@
                   <c:v>421.14519999999999</c:v>
                 </c:pt>
                 <c:pt idx="2">
-                  <c:v>432.27649999999977</c:v>
+                  <c:v>432.27649999999966</c:v>
                 </c:pt>
                 <c:pt idx="3">
-                  <c:v>471.77339599999976</c:v>
+                  <c:v>471.77339599999965</c:v>
                 </c:pt>
                 <c:pt idx="4">
-                  <c:v>513.26929199999961</c:v>
+                  <c:v>513.2692919999995</c:v>
                 </c:pt>
                 <c:pt idx="5">
                   <c:v>576.09000400000002</c:v>
                 </c:pt>
                 <c:pt idx="6">
-                  <c:v>648.40059999999971</c:v>
+                  <c:v>648.4005999999996</c:v>
                 </c:pt>
                 <c:pt idx="7">
                   <c:v>641.87288799999999</c:v>
@@ -717,13 +717,13 @@
                   <c:v>640.61940000000004</c:v>
                 </c:pt>
                 <c:pt idx="9">
-                  <c:v>654.4821079999997</c:v>
+                  <c:v>654.48210799999958</c:v>
                 </c:pt>
                 <c:pt idx="10">
                   <c:v>685.10159599999997</c:v>
                 </c:pt>
                 <c:pt idx="11">
-                  <c:v>732.4102879999997</c:v>
+                  <c:v>732.41028799999958</c:v>
                 </c:pt>
                 <c:pt idx="12">
                   <c:v>783.19810399999994</c:v>
@@ -732,13 +732,13 @@
                   <c:v>842.59429599999999</c:v>
                 </c:pt>
                 <c:pt idx="14">
-                  <c:v>904.8381039999997</c:v>
+                  <c:v>904.83810399999959</c:v>
                 </c:pt>
                 <c:pt idx="15">
-                  <c:v>953.8960119999997</c:v>
+                  <c:v>953.89601199999959</c:v>
                 </c:pt>
                 <c:pt idx="16">
-                  <c:v>983.20880000000034</c:v>
+                  <c:v>983.20880000000045</c:v>
                 </c:pt>
                 <c:pt idx="17">
                   <c:v>1024.9766160000001</c:v>
@@ -747,7 +747,7 @@
                   <c:v>1133.228204</c:v>
                 </c:pt>
                 <c:pt idx="19">
-                  <c:v>1145.4366920000007</c:v>
+                  <c:v>1145.4366920000009</c:v>
                 </c:pt>
                 <c:pt idx="20">
                   <c:v>1142.265216</c:v>
@@ -756,7 +756,7 @@
                   <c:v>1233.2334039999998</c:v>
                 </c:pt>
                 <c:pt idx="22">
-                  <c:v>1302.8916400999992</c:v>
+                  <c:v>1302.891640099999</c:v>
                 </c:pt>
                 <c:pt idx="23">
                   <c:v>1390.963704</c:v>
@@ -777,7 +777,7 @@
                   <c:v>1655.2302139999999</c:v>
                 </c:pt>
                 <c:pt idx="29">
-                  <c:v>1627.4048730000006</c:v>
+                  <c:v>1627.4048730000009</c:v>
                 </c:pt>
                 <c:pt idx="30">
                   <c:v>1665.3092830000001</c:v>
@@ -798,13 +798,13 @@
                   <c:v>2208.2187370000001</c:v>
                 </c:pt>
                 <c:pt idx="36">
-                  <c:v>2249.7285459999985</c:v>
+                  <c:v>2249.728545999998</c:v>
                 </c:pt>
                 <c:pt idx="37">
                   <c:v>2628.2612582099405</c:v>
                 </c:pt>
                 <c:pt idx="38">
-                  <c:v>2786.9538301820703</c:v>
+                  <c:v>2786.9538301820708</c:v>
                 </c:pt>
                 <c:pt idx="39">
                   <c:v>2894.0549715648867</c:v>
@@ -813,7 +813,7 @@
                   <c:v>3048.2750731726728</c:v>
                 </c:pt>
                 <c:pt idx="41">
-                  <c:v>3227.2913864758957</c:v>
+                  <c:v>3227.2913864758962</c:v>
                 </c:pt>
                 <c:pt idx="42">
                   <c:v>3466.4784849999987</c:v>
@@ -829,11 +829,11 @@
           </c:val>
         </c:ser>
         <c:marker val="1"/>
-        <c:axId val="134354816"/>
-        <c:axId val="134356352"/>
+        <c:axId val="68232704"/>
+        <c:axId val="68234240"/>
       </c:lineChart>
       <c:catAx>
-        <c:axId val="134354816"/>
+        <c:axId val="68232704"/>
         <c:scaling>
           <c:orientation val="minMax"/>
         </c:scaling>
@@ -879,7 +879,7 @@
             <a:endParaRPr lang="de-DE"/>
           </a:p>
         </c:txPr>
-        <c:crossAx val="134356352"/>
+        <c:crossAx val="68234240"/>
         <c:crosses val="autoZero"/>
         <c:auto val="1"/>
         <c:lblAlgn val="ctr"/>
@@ -888,7 +888,7 @@
         <c:tickMarkSkip val="2"/>
       </c:catAx>
       <c:valAx>
-        <c:axId val="134356352"/>
+        <c:axId val="68234240"/>
         <c:scaling>
           <c:orientation val="minMax"/>
         </c:scaling>
@@ -942,7 +942,7 @@
             <a:endParaRPr lang="de-DE"/>
           </a:p>
         </c:txPr>
-        <c:crossAx val="134354816"/>
+        <c:crossAx val="68232704"/>
         <c:crosses val="autoZero"/>
         <c:crossBetween val="between"/>
       </c:valAx>
@@ -1363,7 +1363,7 @@
     </p:spTree>
     <p:extLst>
       <p:ext uri="{BB962C8B-B14F-4D97-AF65-F5344CB8AC3E}">
-        <p14:creationId xmlns="" xmlns:p14="http://schemas.microsoft.com/office/powerpoint/2010/main" val="3679785771"/>
+        <p14:creationId xmlns:p14="http://schemas.microsoft.com/office/powerpoint/2010/main" xmlns="" val="3679785771"/>
       </p:ext>
     </p:extLst>
   </p:cSld>
@@ -1647,7 +1647,7 @@
     </p:spTree>
     <p:extLst>
       <p:ext uri="{BB962C8B-B14F-4D97-AF65-F5344CB8AC3E}">
-        <p14:creationId xmlns="" xmlns:p14="http://schemas.microsoft.com/office/powerpoint/2010/main" val="2067393994"/>
+        <p14:creationId xmlns:p14="http://schemas.microsoft.com/office/powerpoint/2010/main" xmlns="" val="2067393994"/>
       </p:ext>
     </p:extLst>
   </p:cSld>
@@ -1819,7 +1819,7 @@
     </p:spTree>
     <p:extLst>
       <p:ext uri="{BB962C8B-B14F-4D97-AF65-F5344CB8AC3E}">
-        <p14:creationId xmlns="" xmlns:p14="http://schemas.microsoft.com/office/powerpoint/2010/main" val="1539779651"/>
+        <p14:creationId xmlns:p14="http://schemas.microsoft.com/office/powerpoint/2010/main" xmlns="" val="1539779651"/>
       </p:ext>
     </p:extLst>
   </p:cSld>
@@ -2001,7 +2001,7 @@
     </p:spTree>
     <p:extLst>
       <p:ext uri="{BB962C8B-B14F-4D97-AF65-F5344CB8AC3E}">
-        <p14:creationId xmlns="" xmlns:p14="http://schemas.microsoft.com/office/powerpoint/2010/main" val="2520127732"/>
+        <p14:creationId xmlns:p14="http://schemas.microsoft.com/office/powerpoint/2010/main" xmlns="" val="2520127732"/>
       </p:ext>
     </p:extLst>
   </p:cSld>
@@ -2173,7 +2173,7 @@
     </p:spTree>
     <p:extLst>
       <p:ext uri="{BB962C8B-B14F-4D97-AF65-F5344CB8AC3E}">
-        <p14:creationId xmlns="" xmlns:p14="http://schemas.microsoft.com/office/powerpoint/2010/main" val="3737118543"/>
+        <p14:creationId xmlns:p14="http://schemas.microsoft.com/office/powerpoint/2010/main" xmlns="" val="3737118543"/>
       </p:ext>
     </p:extLst>
   </p:cSld>
@@ -2419,7 +2419,7 @@
     </p:spTree>
     <p:extLst>
       <p:ext uri="{BB962C8B-B14F-4D97-AF65-F5344CB8AC3E}">
-        <p14:creationId xmlns="" xmlns:p14="http://schemas.microsoft.com/office/powerpoint/2010/main" val="1868366343"/>
+        <p14:creationId xmlns:p14="http://schemas.microsoft.com/office/powerpoint/2010/main" xmlns="" val="1868366343"/>
       </p:ext>
     </p:extLst>
   </p:cSld>
@@ -2653,7 +2653,7 @@
     </p:spTree>
     <p:extLst>
       <p:ext uri="{BB962C8B-B14F-4D97-AF65-F5344CB8AC3E}">
-        <p14:creationId xmlns="" xmlns:p14="http://schemas.microsoft.com/office/powerpoint/2010/main" val="3166666582"/>
+        <p14:creationId xmlns:p14="http://schemas.microsoft.com/office/powerpoint/2010/main" xmlns="" val="3166666582"/>
       </p:ext>
     </p:extLst>
   </p:cSld>
@@ -3022,7 +3022,7 @@
     </p:spTree>
     <p:extLst>
       <p:ext uri="{BB962C8B-B14F-4D97-AF65-F5344CB8AC3E}">
-        <p14:creationId xmlns="" xmlns:p14="http://schemas.microsoft.com/office/powerpoint/2010/main" val="412450708"/>
+        <p14:creationId xmlns:p14="http://schemas.microsoft.com/office/powerpoint/2010/main" xmlns="" val="412450708"/>
       </p:ext>
     </p:extLst>
   </p:cSld>
@@ -3142,7 +3142,7 @@
     </p:spTree>
     <p:extLst>
       <p:ext uri="{BB962C8B-B14F-4D97-AF65-F5344CB8AC3E}">
-        <p14:creationId xmlns="" xmlns:p14="http://schemas.microsoft.com/office/powerpoint/2010/main" val="4075061953"/>
+        <p14:creationId xmlns:p14="http://schemas.microsoft.com/office/powerpoint/2010/main" xmlns="" val="4075061953"/>
       </p:ext>
     </p:extLst>
   </p:cSld>
@@ -3239,7 +3239,7 @@
     </p:spTree>
     <p:extLst>
       <p:ext uri="{BB962C8B-B14F-4D97-AF65-F5344CB8AC3E}">
-        <p14:creationId xmlns="" xmlns:p14="http://schemas.microsoft.com/office/powerpoint/2010/main" val="2387623515"/>
+        <p14:creationId xmlns:p14="http://schemas.microsoft.com/office/powerpoint/2010/main" xmlns="" val="2387623515"/>
       </p:ext>
     </p:extLst>
   </p:cSld>
@@ -3518,7 +3518,7 @@
     </p:spTree>
     <p:extLst>
       <p:ext uri="{BB962C8B-B14F-4D97-AF65-F5344CB8AC3E}">
-        <p14:creationId xmlns="" xmlns:p14="http://schemas.microsoft.com/office/powerpoint/2010/main" val="3381573429"/>
+        <p14:creationId xmlns:p14="http://schemas.microsoft.com/office/powerpoint/2010/main" xmlns="" val="3381573429"/>
       </p:ext>
     </p:extLst>
   </p:cSld>
@@ -3777,7 +3777,7 @@
     </p:spTree>
     <p:extLst>
       <p:ext uri="{BB962C8B-B14F-4D97-AF65-F5344CB8AC3E}">
-        <p14:creationId xmlns="" xmlns:p14="http://schemas.microsoft.com/office/powerpoint/2010/main" val="1858254731"/>
+        <p14:creationId xmlns:p14="http://schemas.microsoft.com/office/powerpoint/2010/main" xmlns="" val="1858254731"/>
       </p:ext>
     </p:extLst>
   </p:cSld>
@@ -4028,7 +4028,7 @@
     </p:spTree>
     <p:extLst>
       <p:ext uri="{BB962C8B-B14F-4D97-AF65-F5344CB8AC3E}">
-        <p14:creationId xmlns="" xmlns:p14="http://schemas.microsoft.com/office/powerpoint/2010/main" val="1750275367"/>
+        <p14:creationId xmlns:p14="http://schemas.microsoft.com/office/powerpoint/2010/main" xmlns="" val="1750275367"/>
       </p:ext>
     </p:extLst>
   </p:cSld>
@@ -17203,7 +17203,7 @@
             <a:blip r:embed="rId7" cstate="print">
               <a:extLst>
                 <a:ext uri="{28A0092B-C50C-407E-A947-70E740481C1C}">
-                  <a14:useLocalDpi xmlns="" xmlns:a14="http://schemas.microsoft.com/office/drawing/2010/main" val="0"/>
+                  <a14:useLocalDpi xmlns:a14="http://schemas.microsoft.com/office/drawing/2010/main" xmlns="" val="0"/>
                 </a:ext>
               </a:extLst>
             </a:blip>
@@ -20829,7 +20829,7 @@
             <a:blip r:embed="rId9" cstate="print">
               <a:extLst>
                 <a:ext uri="{28A0092B-C50C-407E-A947-70E740481C1C}">
-                  <a14:useLocalDpi xmlns="" xmlns:a14="http://schemas.microsoft.com/office/drawing/2010/main" val="0"/>
+                  <a14:useLocalDpi xmlns:a14="http://schemas.microsoft.com/office/drawing/2010/main" xmlns="" val="0"/>
                 </a:ext>
               </a:extLst>
             </a:blip>
@@ -20857,7 +20857,7 @@
           <p:nvPr>
             <p:extLst>
               <p:ext uri="{D42A27DB-BD31-4B8C-83A1-F6EECF244321}">
-                <p14:modId xmlns="" xmlns:p14="http://schemas.microsoft.com/office/powerpoint/2010/main" val="1062948645"/>
+                <p14:modId xmlns:p14="http://schemas.microsoft.com/office/powerpoint/2010/main" xmlns="" val="1062948645"/>
               </p:ext>
             </p:extLst>
           </p:nvPr>
@@ -21808,32 +21808,34 @@
       </p:sp>
       <p:pic>
         <p:nvPicPr>
-          <p:cNvPr id="95" name="Grafik 94"/>
+          <p:cNvPr id="1026" name="Picture 2" descr="C:\Users\thors\Download\QR- Code zur Literatur.png"/>
           <p:cNvPicPr>
-            <a:picLocks noChangeAspect="1"/>
+            <a:picLocks noChangeAspect="1" noChangeArrowheads="1"/>
           </p:cNvPicPr>
           <p:nvPr/>
         </p:nvPicPr>
         <p:blipFill>
           <a:blip r:embed="rId11" cstate="print"/>
+          <a:srcRect/>
           <a:stretch>
             <a:fillRect/>
           </a:stretch>
         </p:blipFill>
-        <p:spPr>
+        <p:spPr bwMode="auto">
           <a:xfrm>
-            <a:off x="26638259" y="15569250"/>
-            <a:ext cx="2520000" cy="2267992"/>
+            <a:off x="26098500" y="15259050"/>
+            <a:ext cx="2857500" cy="2857500"/>
           </a:xfrm>
           <a:prstGeom prst="rect">
             <a:avLst/>
           </a:prstGeom>
+          <a:noFill/>
         </p:spPr>
       </p:pic>
     </p:spTree>
     <p:extLst>
       <p:ext uri="{BB962C8B-B14F-4D97-AF65-F5344CB8AC3E}">
-        <p14:creationId xmlns="" xmlns:p14="http://schemas.microsoft.com/office/powerpoint/2010/main" val="2150636527"/>
+        <p14:creationId xmlns:p14="http://schemas.microsoft.com/office/powerpoint/2010/main" xmlns="" val="2150636527"/>
       </p:ext>
     </p:extLst>
   </p:cSld>
@@ -22105,7 +22107,7 @@
   <a:extraClrSchemeLst/>
   <a:extLst>
     <a:ext uri="{05A4C25C-085E-4340-85A3-A5531E510DB2}">
-      <thm15:themeFamily xmlns="" xmlns:thm15="http://schemas.microsoft.com/office/thememl/2012/main" name="Office Theme" id="{62F939B6-93AF-4DB8-9C6B-D6C7DFDC589F}" vid="{4A3C46E8-61CC-4603-A589-7422A47A8E4A}"/>
+      <thm15:themeFamily xmlns:thm15="http://schemas.microsoft.com/office/thememl/2012/main" xmlns="" name="Office Theme" id="{62F939B6-93AF-4DB8-9C6B-D6C7DFDC589F}" vid="{4A3C46E8-61CC-4603-A589-7422A47A8E4A}"/>
     </a:ext>
   </a:extLst>
 </a:theme>
@@ -22366,7 +22368,7 @@
   <a:extraClrSchemeLst/>
   <a:extLst>
     <a:ext uri="{05A4C25C-085E-4340-85A3-A5531E510DB2}">
-      <thm15:themeFamily xmlns="" xmlns:thm15="http://schemas.microsoft.com/office/thememl/2012/main" name="Office Theme" id="{62F939B6-93AF-4DB8-9C6B-D6C7DFDC589F}" vid="{4A3C46E8-61CC-4603-A589-7422A47A8E4A}"/>
+      <thm15:themeFamily xmlns:thm15="http://schemas.microsoft.com/office/thememl/2012/main" xmlns="" name="Office Theme" id="{62F939B6-93AF-4DB8-9C6B-D6C7DFDC589F}" vid="{4A3C46E8-61CC-4603-A589-7422A47A8E4A}"/>
     </a:ext>
   </a:extLst>
 </a:theme>

</xml_diff>